<commit_message>
Deploy preview for PR 3 🛫
</commit_message>
<xml_diff>
--- a/pr-preview/pr-3/README.pptx
+++ b/pr-preview/pr-3/README.pptx
@@ -597,7 +597,8 @@
           <a:p>
             <a:r>
               <a:rPr lang="en-US" dirty="0"/>
-              <a:t>Comments for the slide for the presenters
+              <a:t>Being able to automate the low level, labor intensive parts of project management is critical. There are many tools in the Fedora and Github ecosystems that facilitate project management, such as GitHub Actions, Packit, and more. Learn how the Linux System Roles team leveraged these tools to perform:
+Comments for the slide for the presenters
 For slies syntax examples use https://github.com/ralexander-phi/marp-to-pages/blob/main/README.md and https://github.com/spetrosi/jak_psat_moderni_ucebnice/blob/dev/README.md</a:t>
             </a:r>
             <a:endParaRPr lang="en-US" dirty="0"/>
@@ -774,7 +775,7 @@
           <a:p>
             <a:r>
               <a:rPr lang="en-US" dirty="0"/>
-              <a:t>Automating Bumping of Semantic Version and Changelog Collection with Conventional Commits</a:t>
+              <a:t/>
             </a:r>
             <a:endParaRPr lang="en-US" dirty="0"/>
           </a:p>
@@ -862,7 +863,7 @@
           <a:p>
             <a:r>
               <a:rPr lang="en-US" dirty="0"/>
-              <a:t/>
+              <a:t>We have a GitHub action that we run when we want to create a new release. This action does the following:</a:t>
             </a:r>
             <a:endParaRPr lang="en-US" dirty="0"/>
           </a:p>

</xml_diff>